<commit_message>
Added color pallete and icons to wireframes. Updated some navigation.
</commit_message>
<xml_diff>
--- a/Design/Wireframes/DRIC wireframes.pptx
+++ b/Design/Wireframes/DRIC wireframes.pptx
@@ -5,13 +5,15 @@
     <p:sldMasterId id="2147483672" r:id="rId1"/>
   </p:sldMasterIdLst>
   <p:notesMasterIdLst>
-    <p:notesMasterId r:id="rId6"/>
+    <p:notesMasterId r:id="rId8"/>
   </p:notesMasterIdLst>
   <p:sldIdLst>
     <p:sldId id="263" r:id="rId2"/>
     <p:sldId id="264" r:id="rId3"/>
     <p:sldId id="265" r:id="rId4"/>
     <p:sldId id="266" r:id="rId5"/>
+    <p:sldId id="267" r:id="rId6"/>
+    <p:sldId id="268" r:id="rId7"/>
   </p:sldIdLst>
   <p:sldSz cx="9144000" cy="6858000" type="screen4x3"/>
   <p:notesSz cx="7010400" cy="9296400"/>
@@ -195,7 +197,7 @@
           <a:p>
             <a:fld id="{8E93098F-1000-4F85-9F35-40A3F3C1DAF8}" type="datetimeFigureOut">
               <a:rPr lang="en-US" smtClean="0"/>
-              <a:t>6/17/2015</a:t>
+              <a:t>6/18/2015</a:t>
             </a:fld>
             <a:endParaRPr lang="en-US"/>
           </a:p>
@@ -869,7 +871,7 @@
             <a:fld id="{032CCAA4-70F9-4347-A6BC-65B95A477A91}" type="datetimeFigureOut">
               <a:rPr lang="en-US" smtClean="0"/>
               <a:pPr/>
-              <a:t>6/17/2015</a:t>
+              <a:t>6/18/2015</a:t>
             </a:fld>
             <a:endParaRPr lang="en-US"/>
           </a:p>
@@ -1054,7 +1056,7 @@
             <a:fld id="{032CCAA4-70F9-4347-A6BC-65B95A477A91}" type="datetimeFigureOut">
               <a:rPr lang="en-US" smtClean="0"/>
               <a:pPr/>
-              <a:t>6/17/2015</a:t>
+              <a:t>6/18/2015</a:t>
             </a:fld>
             <a:endParaRPr lang="en-US"/>
           </a:p>
@@ -1249,7 +1251,7 @@
             <a:fld id="{032CCAA4-70F9-4347-A6BC-65B95A477A91}" type="datetimeFigureOut">
               <a:rPr lang="en-US" smtClean="0"/>
               <a:pPr/>
-              <a:t>6/17/2015</a:t>
+              <a:t>6/18/2015</a:t>
             </a:fld>
             <a:endParaRPr lang="en-US"/>
           </a:p>
@@ -1442,7 +1444,7 @@
             <a:fld id="{032CCAA4-70F9-4347-A6BC-65B95A477A91}" type="datetimeFigureOut">
               <a:rPr lang="en-US" smtClean="0"/>
               <a:pPr/>
-              <a:t>6/17/2015</a:t>
+              <a:t>6/18/2015</a:t>
             </a:fld>
             <a:endParaRPr lang="en-US"/>
           </a:p>
@@ -1649,7 +1651,7 @@
             <a:fld id="{032CCAA4-70F9-4347-A6BC-65B95A477A91}" type="datetimeFigureOut">
               <a:rPr lang="en-US" smtClean="0"/>
               <a:pPr/>
-              <a:t>6/17/2015</a:t>
+              <a:t>6/18/2015</a:t>
             </a:fld>
             <a:endParaRPr lang="en-US"/>
           </a:p>
@@ -1952,7 +1954,7 @@
             <a:fld id="{032CCAA4-70F9-4347-A6BC-65B95A477A91}" type="datetimeFigureOut">
               <a:rPr lang="en-US" smtClean="0"/>
               <a:pPr/>
-              <a:t>6/17/2015</a:t>
+              <a:t>6/18/2015</a:t>
             </a:fld>
             <a:endParaRPr lang="en-US"/>
           </a:p>
@@ -2394,7 +2396,7 @@
             <a:fld id="{032CCAA4-70F9-4347-A6BC-65B95A477A91}" type="datetimeFigureOut">
               <a:rPr lang="en-US" smtClean="0"/>
               <a:pPr/>
-              <a:t>6/17/2015</a:t>
+              <a:t>6/18/2015</a:t>
             </a:fld>
             <a:endParaRPr lang="en-US"/>
           </a:p>
@@ -2527,7 +2529,7 @@
             <a:fld id="{032CCAA4-70F9-4347-A6BC-65B95A477A91}" type="datetimeFigureOut">
               <a:rPr lang="en-US" smtClean="0"/>
               <a:pPr/>
-              <a:t>6/17/2015</a:t>
+              <a:t>6/18/2015</a:t>
             </a:fld>
             <a:endParaRPr lang="en-US"/>
           </a:p>
@@ -2637,7 +2639,7 @@
             <a:fld id="{032CCAA4-70F9-4347-A6BC-65B95A477A91}" type="datetimeFigureOut">
               <a:rPr lang="en-US" smtClean="0"/>
               <a:pPr/>
-              <a:t>6/17/2015</a:t>
+              <a:t>6/18/2015</a:t>
             </a:fld>
             <a:endParaRPr lang="en-US"/>
           </a:p>
@@ -2929,7 +2931,7 @@
             <a:fld id="{032CCAA4-70F9-4347-A6BC-65B95A477A91}" type="datetimeFigureOut">
               <a:rPr lang="en-US" smtClean="0"/>
               <a:pPr/>
-              <a:t>6/17/2015</a:t>
+              <a:t>6/18/2015</a:t>
             </a:fld>
             <a:endParaRPr lang="en-US"/>
           </a:p>
@@ -3201,7 +3203,7 @@
             <a:fld id="{032CCAA4-70F9-4347-A6BC-65B95A477A91}" type="datetimeFigureOut">
               <a:rPr lang="en-US" smtClean="0"/>
               <a:pPr/>
-              <a:t>6/17/2015</a:t>
+              <a:t>6/18/2015</a:t>
             </a:fld>
             <a:endParaRPr lang="en-US"/>
           </a:p>
@@ -3456,7 +3458,7 @@
             <a:fld id="{032CCAA4-70F9-4347-A6BC-65B95A477A91}" type="datetimeFigureOut">
               <a:rPr lang="en-US" smtClean="0"/>
               <a:pPr/>
-              <a:t>6/17/2015</a:t>
+              <a:t>6/18/2015</a:t>
             </a:fld>
             <a:endParaRPr lang="en-US"/>
           </a:p>
@@ -4330,18 +4332,7 @@
                 <a:ea typeface="+mj-ea"/>
                 <a:cs typeface="ＭＳ Ｐゴシック"/>
               </a:rPr>
-              <a:t>By </a:t>
-            </a:r>
-            <a:r>
-              <a:rPr lang="en-US" sz="2200" kern="0" dirty="0" smtClean="0">
-                <a:solidFill>
-                  <a:srgbClr val="A79F94"/>
-                </a:solidFill>
-                <a:latin typeface="85 Helvetica Heavy"/>
-                <a:ea typeface="+mj-ea"/>
-                <a:cs typeface="ＭＳ Ｐゴシック"/>
-              </a:rPr>
-              <a:t>Adam D’Angelo</a:t>
+              <a:t>By Adam D’Angelo</a:t>
             </a:r>
             <a:endParaRPr kumimoji="0" lang="en-US" sz="2200" b="0" i="0" u="none" strike="noStrike" kern="0" cap="none" spc="0" normalizeH="0" baseline="0" noProof="0" dirty="0" smtClean="0">
               <a:ln>
@@ -5153,17 +5144,36 @@
               </a:rPr>
               <a:t>Search</a:t>
             </a:r>
-            <a:endParaRPr kumimoji="0" lang="en-US" sz="1000" b="0" i="0" u="none" strike="noStrike" cap="none" normalizeH="0" baseline="0" dirty="0" smtClean="0">
-              <a:ln>
-                <a:noFill/>
-              </a:ln>
-              <a:solidFill>
-                <a:schemeClr val="tx1"/>
-              </a:solidFill>
-              <a:effectLst/>
-              <a:latin typeface="Arial" charset="0"/>
-              <a:ea typeface="ＭＳ Ｐゴシック" pitchFamily="-60" charset="-128"/>
-            </a:endParaRPr>
+          </a:p>
+        </p:txBody>
+      </p:sp>
+      <p:sp>
+        <p:nvSpPr>
+          <p:cNvPr id="3" name="TextBox 2"/>
+          <p:cNvSpPr txBox="1"/>
+          <p:nvPr/>
+        </p:nvSpPr>
+        <p:spPr>
+          <a:xfrm>
+            <a:off x="6705600" y="3091934"/>
+            <a:ext cx="1447800" cy="1200329"/>
+          </a:xfrm>
+          <a:prstGeom prst="rect">
+            <a:avLst/>
+          </a:prstGeom>
+          <a:noFill/>
+        </p:spPr>
+        <p:txBody>
+          <a:bodyPr wrap="square" rtlCol="0">
+            <a:spAutoFit/>
+          </a:bodyPr>
+          <a:lstStyle/>
+          <a:p>
+            <a:r>
+              <a:rPr lang="en-US" dirty="0" smtClean="0"/>
+              <a:t>Shows top ten recent drug recalls by date</a:t>
+            </a:r>
+            <a:endParaRPr lang="en-US" dirty="0"/>
           </a:p>
         </p:txBody>
       </p:sp>
@@ -5911,17 +5921,36 @@
               </a:rPr>
               <a:t>Search</a:t>
             </a:r>
-            <a:endParaRPr kumimoji="0" lang="en-US" sz="1000" b="0" i="0" u="none" strike="noStrike" cap="none" normalizeH="0" baseline="0" dirty="0" smtClean="0">
-              <a:ln>
-                <a:noFill/>
-              </a:ln>
-              <a:solidFill>
-                <a:schemeClr val="tx1"/>
-              </a:solidFill>
-              <a:effectLst/>
-              <a:latin typeface="Arial" charset="0"/>
-              <a:ea typeface="ＭＳ Ｐゴシック" pitchFamily="-60" charset="-128"/>
-            </a:endParaRPr>
+          </a:p>
+        </p:txBody>
+      </p:sp>
+      <p:sp>
+        <p:nvSpPr>
+          <p:cNvPr id="3" name="TextBox 2"/>
+          <p:cNvSpPr txBox="1"/>
+          <p:nvPr/>
+        </p:nvSpPr>
+        <p:spPr>
+          <a:xfrm>
+            <a:off x="6705600" y="2669977"/>
+            <a:ext cx="2209800" cy="1200329"/>
+          </a:xfrm>
+          <a:prstGeom prst="rect">
+            <a:avLst/>
+          </a:prstGeom>
+          <a:noFill/>
+        </p:spPr>
+        <p:txBody>
+          <a:bodyPr wrap="square" rtlCol="0">
+            <a:spAutoFit/>
+          </a:bodyPr>
+          <a:lstStyle/>
+          <a:p>
+            <a:r>
+              <a:rPr lang="en-US" dirty="0" smtClean="0"/>
+              <a:t>Displays drug recalls related to the name the user entered.</a:t>
+            </a:r>
+            <a:endParaRPr lang="en-US" dirty="0"/>
           </a:p>
         </p:txBody>
       </p:sp>
@@ -6063,14 +6092,366 @@
       </p:pic>
       <p:sp>
         <p:nvSpPr>
-          <p:cNvPr id="6" name="Rectangle 5"/>
+          <p:cNvPr id="7" name="TextBox 6"/>
+          <p:cNvSpPr txBox="1"/>
+          <p:nvPr/>
+        </p:nvSpPr>
+        <p:spPr>
+          <a:xfrm>
+            <a:off x="3314700" y="1460541"/>
+            <a:ext cx="2209800" cy="307777"/>
+          </a:xfrm>
+          <a:prstGeom prst="rect">
+            <a:avLst/>
+          </a:prstGeom>
+          <a:noFill/>
+        </p:spPr>
+        <p:txBody>
+          <a:bodyPr wrap="square" rtlCol="0">
+            <a:spAutoFit/>
+          </a:bodyPr>
+          <a:lstStyle/>
+          <a:p>
+            <a:r>
+              <a:rPr lang="en-US" sz="1400" u="sng" dirty="0" smtClean="0"/>
+              <a:t>Drug #1 Recall Details</a:t>
+            </a:r>
+            <a:endParaRPr lang="en-US" sz="1400" u="sng" dirty="0"/>
+          </a:p>
+        </p:txBody>
+      </p:sp>
+      <p:sp>
+        <p:nvSpPr>
+          <p:cNvPr id="8" name="TextBox 7"/>
+          <p:cNvSpPr txBox="1"/>
+          <p:nvPr/>
+        </p:nvSpPr>
+        <p:spPr>
+          <a:xfrm>
+            <a:off x="4143375" y="795160"/>
+            <a:ext cx="2247900" cy="646331"/>
+          </a:xfrm>
+          <a:prstGeom prst="rect">
+            <a:avLst/>
+          </a:prstGeom>
+          <a:noFill/>
+        </p:spPr>
+        <p:txBody>
+          <a:bodyPr wrap="square" rtlCol="0">
+            <a:spAutoFit/>
+          </a:bodyPr>
+          <a:lstStyle/>
+          <a:p>
+            <a:r>
+              <a:rPr lang="en-US" dirty="0" smtClean="0"/>
+              <a:t>Drug Recall Information Center</a:t>
+            </a:r>
+            <a:endParaRPr lang="en-US" dirty="0"/>
+          </a:p>
+        </p:txBody>
+      </p:sp>
+      <p:sp>
+        <p:nvSpPr>
+          <p:cNvPr id="12" name="Oval 11"/>
           <p:cNvSpPr/>
           <p:nvPr/>
         </p:nvSpPr>
         <p:spPr bwMode="auto">
           <a:xfrm>
-            <a:off x="2965449" y="1862852"/>
-            <a:ext cx="1504950" cy="236696"/>
+            <a:off x="5334000" y="1832015"/>
+            <a:ext cx="696278" cy="732709"/>
+          </a:xfrm>
+          <a:prstGeom prst="ellipse">
+            <a:avLst/>
+          </a:prstGeom>
+          <a:solidFill>
+            <a:srgbClr val="FFFF00"/>
+          </a:solidFill>
+          <a:ln w="9525" cap="flat" cmpd="sng" algn="ctr">
+            <a:solidFill>
+              <a:schemeClr val="tx1"/>
+            </a:solidFill>
+            <a:prstDash val="solid"/>
+            <a:round/>
+            <a:headEnd type="none" w="med" len="med"/>
+            <a:tailEnd type="none" w="med" len="med"/>
+          </a:ln>
+          <a:effectLst/>
+        </p:spPr>
+        <p:txBody>
+          <a:bodyPr vert="horz" wrap="square" lIns="91440" tIns="45720" rIns="91440" bIns="45720" numCol="1" rtlCol="0" anchor="t" anchorCtr="0" compatLnSpc="1">
+            <a:prstTxWarp prst="textNoShape">
+              <a:avLst/>
+            </a:prstTxWarp>
+          </a:bodyPr>
+          <a:lstStyle/>
+          <a:p>
+            <a:pPr marL="0" marR="0" indent="0" algn="ctr" defTabSz="914400" rtl="0" eaLnBrk="0" fontAlgn="base" latinLnBrk="0" hangingPunct="0">
+              <a:lnSpc>
+                <a:spcPct val="200000"/>
+              </a:lnSpc>
+              <a:spcBef>
+                <a:spcPct val="0"/>
+              </a:spcBef>
+              <a:spcAft>
+                <a:spcPct val="0"/>
+              </a:spcAft>
+              <a:buClrTx/>
+              <a:buSzTx/>
+              <a:buFontTx/>
+              <a:buNone/>
+              <a:tabLst/>
+            </a:pPr>
+            <a:r>
+              <a:rPr kumimoji="0" lang="en-US" sz="1000" b="0" i="0" u="none" strike="noStrike" cap="none" normalizeH="0" baseline="0" dirty="0" smtClean="0">
+                <a:ln>
+                  <a:noFill/>
+                </a:ln>
+                <a:solidFill>
+                  <a:schemeClr val="tx1"/>
+                </a:solidFill>
+                <a:effectLst/>
+                <a:latin typeface="Arial" charset="0"/>
+                <a:ea typeface="ＭＳ Ｐゴシック" pitchFamily="-60" charset="-128"/>
+              </a:rPr>
+              <a:t>Low</a:t>
+            </a:r>
+          </a:p>
+        </p:txBody>
+      </p:sp>
+      <p:sp>
+        <p:nvSpPr>
+          <p:cNvPr id="18" name="Rounded Rectangle 17"/>
+          <p:cNvSpPr/>
+          <p:nvPr/>
+        </p:nvSpPr>
+        <p:spPr bwMode="auto">
+          <a:xfrm>
+            <a:off x="4808695" y="5562600"/>
+            <a:ext cx="1582580" cy="224551"/>
+          </a:xfrm>
+          <a:prstGeom prst="roundRect">
+            <a:avLst/>
+          </a:prstGeom>
+          <a:solidFill>
+            <a:schemeClr val="accent3">
+              <a:lumMod val="85000"/>
+            </a:schemeClr>
+          </a:solidFill>
+          <a:ln w="9525" cap="flat" cmpd="sng" algn="ctr">
+            <a:solidFill>
+              <a:schemeClr val="tx1"/>
+            </a:solidFill>
+            <a:prstDash val="solid"/>
+            <a:round/>
+            <a:headEnd type="none" w="med" len="med"/>
+            <a:tailEnd type="none" w="med" len="med"/>
+          </a:ln>
+          <a:effectLst/>
+        </p:spPr>
+        <p:txBody>
+          <a:bodyPr vert="horz" wrap="square" lIns="91440" tIns="45720" rIns="91440" bIns="45720" numCol="1" rtlCol="0" anchor="t" anchorCtr="0" compatLnSpc="1">
+            <a:prstTxWarp prst="textNoShape">
+              <a:avLst/>
+            </a:prstTxWarp>
+          </a:bodyPr>
+          <a:lstStyle/>
+          <a:p>
+            <a:pPr marL="0" marR="0" indent="0" algn="ctr" defTabSz="914400" rtl="0" eaLnBrk="0" fontAlgn="base" latinLnBrk="0" hangingPunct="0">
+              <a:lnSpc>
+                <a:spcPct val="100000"/>
+              </a:lnSpc>
+              <a:spcBef>
+                <a:spcPct val="0"/>
+              </a:spcBef>
+              <a:spcAft>
+                <a:spcPct val="0"/>
+              </a:spcAft>
+              <a:buClrTx/>
+              <a:buSzTx/>
+              <a:buFontTx/>
+              <a:buNone/>
+              <a:tabLst/>
+            </a:pPr>
+            <a:r>
+              <a:rPr kumimoji="0" lang="en-US" sz="1000" b="0" i="0" u="none" strike="noStrike" cap="none" normalizeH="0" baseline="0" dirty="0" smtClean="0">
+                <a:ln>
+                  <a:noFill/>
+                </a:ln>
+                <a:solidFill>
+                  <a:schemeClr val="tx1"/>
+                </a:solidFill>
+                <a:effectLst/>
+                <a:latin typeface="Arial" charset="0"/>
+                <a:ea typeface="ＭＳ Ｐゴシック" pitchFamily="-60" charset="-128"/>
+              </a:rPr>
+              <a:t>Back </a:t>
+            </a:r>
+            <a:r>
+              <a:rPr kumimoji="0" lang="en-US" sz="1000" b="0" i="0" u="none" strike="noStrike" cap="none" normalizeH="0" dirty="0" smtClean="0">
+                <a:ln>
+                  <a:noFill/>
+                </a:ln>
+                <a:solidFill>
+                  <a:schemeClr val="tx1"/>
+                </a:solidFill>
+                <a:effectLst/>
+                <a:latin typeface="Arial" charset="0"/>
+                <a:ea typeface="ＭＳ Ｐゴシック" pitchFamily="-60" charset="-128"/>
+              </a:rPr>
+              <a:t>to search results</a:t>
+            </a:r>
+            <a:endParaRPr kumimoji="0" lang="en-US" sz="1000" b="0" i="0" u="none" strike="noStrike" cap="none" normalizeH="0" baseline="0" dirty="0" smtClean="0">
+              <a:ln>
+                <a:noFill/>
+              </a:ln>
+              <a:solidFill>
+                <a:schemeClr val="tx1"/>
+              </a:solidFill>
+              <a:effectLst/>
+              <a:latin typeface="Arial" charset="0"/>
+              <a:ea typeface="ＭＳ Ｐゴシック" pitchFamily="-60" charset="-128"/>
+            </a:endParaRPr>
+          </a:p>
+        </p:txBody>
+      </p:sp>
+      <p:sp>
+        <p:nvSpPr>
+          <p:cNvPr id="3" name="Rounded Rectangle 2"/>
+          <p:cNvSpPr/>
+          <p:nvPr/>
+        </p:nvSpPr>
+        <p:spPr bwMode="auto">
+          <a:xfrm>
+            <a:off x="4143375" y="1832015"/>
+            <a:ext cx="752475" cy="732709"/>
+          </a:xfrm>
+          <a:prstGeom prst="roundRect">
+            <a:avLst/>
+          </a:prstGeom>
+          <a:solidFill>
+            <a:srgbClr val="92D050"/>
+          </a:solidFill>
+          <a:ln w="9525" cap="flat" cmpd="sng" algn="ctr">
+            <a:solidFill>
+              <a:schemeClr val="tx1"/>
+            </a:solidFill>
+            <a:prstDash val="solid"/>
+            <a:round/>
+            <a:headEnd type="none" w="med" len="med"/>
+            <a:tailEnd type="none" w="med" len="med"/>
+          </a:ln>
+          <a:effectLst/>
+        </p:spPr>
+        <p:txBody>
+          <a:bodyPr vert="horz" wrap="square" lIns="91440" tIns="45720" rIns="91440" bIns="45720" numCol="1" rtlCol="0" anchor="t" anchorCtr="0" compatLnSpc="1">
+            <a:prstTxWarp prst="textNoShape">
+              <a:avLst/>
+            </a:prstTxWarp>
+          </a:bodyPr>
+          <a:lstStyle/>
+          <a:p>
+            <a:pPr marL="0" marR="0" indent="0" algn="l" defTabSz="914400" rtl="0" eaLnBrk="0" fontAlgn="base" latinLnBrk="0" hangingPunct="0">
+              <a:lnSpc>
+                <a:spcPct val="150000"/>
+              </a:lnSpc>
+              <a:spcBef>
+                <a:spcPct val="0"/>
+              </a:spcBef>
+              <a:spcAft>
+                <a:spcPct val="0"/>
+              </a:spcAft>
+              <a:buClrTx/>
+              <a:buSzTx/>
+              <a:buFontTx/>
+              <a:buNone/>
+              <a:tabLst/>
+            </a:pPr>
+            <a:r>
+              <a:rPr kumimoji="0" lang="en-US" sz="800" b="0" i="0" u="none" strike="noStrike" cap="none" normalizeH="0" baseline="0" dirty="0" smtClean="0">
+                <a:ln>
+                  <a:noFill/>
+                </a:ln>
+                <a:solidFill>
+                  <a:schemeClr val="tx1"/>
+                </a:solidFill>
+                <a:effectLst/>
+                <a:latin typeface="Arial" charset="0"/>
+                <a:ea typeface="ＭＳ Ｐゴシック" pitchFamily="-60" charset="-128"/>
+              </a:rPr>
+              <a:t>&lt;Image of drug here from </a:t>
+            </a:r>
+            <a:r>
+              <a:rPr kumimoji="0" lang="en-US" sz="800" b="0" i="0" u="none" strike="noStrike" cap="none" normalizeH="0" baseline="0" dirty="0" err="1" smtClean="0">
+                <a:ln>
+                  <a:noFill/>
+                </a:ln>
+                <a:solidFill>
+                  <a:schemeClr val="tx1"/>
+                </a:solidFill>
+                <a:effectLst/>
+                <a:latin typeface="Arial" charset="0"/>
+                <a:ea typeface="ＭＳ Ｐゴシック" pitchFamily="-60" charset="-128"/>
+              </a:rPr>
+              <a:t>NiH</a:t>
+            </a:r>
+            <a:r>
+              <a:rPr kumimoji="0" lang="en-US" sz="800" b="0" i="0" u="none" strike="noStrike" cap="none" normalizeH="0" baseline="0" dirty="0" smtClean="0">
+                <a:ln>
+                  <a:noFill/>
+                </a:ln>
+                <a:solidFill>
+                  <a:schemeClr val="tx1"/>
+                </a:solidFill>
+                <a:effectLst/>
+                <a:latin typeface="Arial" charset="0"/>
+                <a:ea typeface="ＭＳ Ｐゴシック" pitchFamily="-60" charset="-128"/>
+              </a:rPr>
+              <a:t>&gt;</a:t>
+            </a:r>
+          </a:p>
+        </p:txBody>
+      </p:sp>
+      <p:sp>
+        <p:nvSpPr>
+          <p:cNvPr id="19" name="TextBox 18"/>
+          <p:cNvSpPr txBox="1"/>
+          <p:nvPr/>
+        </p:nvSpPr>
+        <p:spPr>
+          <a:xfrm>
+            <a:off x="3314700" y="2973527"/>
+            <a:ext cx="2209800" cy="307777"/>
+          </a:xfrm>
+          <a:prstGeom prst="rect">
+            <a:avLst/>
+          </a:prstGeom>
+          <a:noFill/>
+        </p:spPr>
+        <p:txBody>
+          <a:bodyPr wrap="square" rtlCol="0">
+            <a:spAutoFit/>
+          </a:bodyPr>
+          <a:lstStyle/>
+          <a:p>
+            <a:r>
+              <a:rPr lang="en-US" sz="1400" u="sng" dirty="0" smtClean="0"/>
+              <a:t>Additional information</a:t>
+            </a:r>
+            <a:endParaRPr lang="en-US" sz="1400" u="sng" dirty="0"/>
+          </a:p>
+        </p:txBody>
+      </p:sp>
+      <p:sp>
+        <p:nvSpPr>
+          <p:cNvPr id="20" name="Rectangle 19"/>
+          <p:cNvSpPr/>
+          <p:nvPr/>
+        </p:nvSpPr>
+        <p:spPr bwMode="auto">
+          <a:xfrm>
+            <a:off x="3032124" y="3281304"/>
+            <a:ext cx="2819400" cy="1608237"/>
           </a:xfrm>
           <a:prstGeom prst="rect">
             <a:avLst/>
@@ -6129,14 +6510,14 @@
       </p:sp>
       <p:sp>
         <p:nvSpPr>
-          <p:cNvPr id="7" name="TextBox 6"/>
+          <p:cNvPr id="22" name="TextBox 21"/>
           <p:cNvSpPr txBox="1"/>
           <p:nvPr/>
         </p:nvSpPr>
         <p:spPr>
           <a:xfrm>
-            <a:off x="3314700" y="2362200"/>
-            <a:ext cx="2209800" cy="307777"/>
+            <a:off x="3276600" y="3441741"/>
+            <a:ext cx="1990725" cy="707886"/>
           </a:xfrm>
           <a:prstGeom prst="rect">
             <a:avLst/>
@@ -6150,389 +6531,29 @@
           <a:lstStyle/>
           <a:p>
             <a:r>
-              <a:rPr lang="en-US" sz="1400" u="sng" dirty="0" smtClean="0"/>
-              <a:t>Drug #1 Recall Details</a:t>
-            </a:r>
-            <a:endParaRPr lang="en-US" sz="1400" u="sng" dirty="0"/>
-          </a:p>
-        </p:txBody>
-      </p:sp>
-      <p:sp>
-        <p:nvSpPr>
-          <p:cNvPr id="8" name="TextBox 7"/>
-          <p:cNvSpPr txBox="1"/>
-          <p:nvPr/>
-        </p:nvSpPr>
-        <p:spPr>
-          <a:xfrm>
-            <a:off x="4143375" y="795160"/>
-            <a:ext cx="2247900" cy="646331"/>
-          </a:xfrm>
-          <a:prstGeom prst="rect">
-            <a:avLst/>
-          </a:prstGeom>
-          <a:noFill/>
-        </p:spPr>
-        <p:txBody>
-          <a:bodyPr wrap="square" rtlCol="0">
-            <a:spAutoFit/>
-          </a:bodyPr>
-          <a:lstStyle/>
-          <a:p>
-            <a:r>
-              <a:rPr lang="en-US" dirty="0" smtClean="0"/>
-              <a:t>Drug Recall Information Center</a:t>
-            </a:r>
-            <a:endParaRPr lang="en-US" dirty="0"/>
-          </a:p>
-        </p:txBody>
-      </p:sp>
-      <p:sp>
-        <p:nvSpPr>
-          <p:cNvPr id="12" name="Oval 11"/>
+              <a:rPr lang="en-US" sz="1000" dirty="0" smtClean="0"/>
+              <a:t>Hyperlinks to Google search results here for “&lt;drug name&gt; + recall” and &lt;drug manufacturer&gt; + recall”.</a:t>
+            </a:r>
+            <a:endParaRPr lang="en-US" sz="1000" dirty="0"/>
+          </a:p>
+        </p:txBody>
+      </p:sp>
+      <p:sp>
+        <p:nvSpPr>
+          <p:cNvPr id="23" name="Rectangle 22"/>
           <p:cNvSpPr/>
           <p:nvPr/>
         </p:nvSpPr>
         <p:spPr bwMode="auto">
           <a:xfrm>
-            <a:off x="5334000" y="2733674"/>
-            <a:ext cx="696278" cy="732709"/>
-          </a:xfrm>
-          <a:prstGeom prst="ellipse">
-            <a:avLst/>
-          </a:prstGeom>
-          <a:solidFill>
-            <a:srgbClr val="FFFF00"/>
-          </a:solidFill>
-          <a:ln w="9525" cap="flat" cmpd="sng" algn="ctr">
-            <a:solidFill>
-              <a:schemeClr val="tx1"/>
-            </a:solidFill>
-            <a:prstDash val="solid"/>
-            <a:round/>
-            <a:headEnd type="none" w="med" len="med"/>
-            <a:tailEnd type="none" w="med" len="med"/>
-          </a:ln>
-          <a:effectLst/>
-        </p:spPr>
-        <p:txBody>
-          <a:bodyPr vert="horz" wrap="square" lIns="91440" tIns="45720" rIns="91440" bIns="45720" numCol="1" rtlCol="0" anchor="t" anchorCtr="0" compatLnSpc="1">
-            <a:prstTxWarp prst="textNoShape">
-              <a:avLst/>
-            </a:prstTxWarp>
-          </a:bodyPr>
-          <a:lstStyle/>
-          <a:p>
-            <a:pPr marL="0" marR="0" indent="0" algn="ctr" defTabSz="914400" rtl="0" eaLnBrk="0" fontAlgn="base" latinLnBrk="0" hangingPunct="0">
-              <a:lnSpc>
-                <a:spcPct val="200000"/>
-              </a:lnSpc>
-              <a:spcBef>
-                <a:spcPct val="0"/>
-              </a:spcBef>
-              <a:spcAft>
-                <a:spcPct val="0"/>
-              </a:spcAft>
-              <a:buClrTx/>
-              <a:buSzTx/>
-              <a:buFontTx/>
-              <a:buNone/>
-              <a:tabLst/>
-            </a:pPr>
-            <a:r>
-              <a:rPr kumimoji="0" lang="en-US" sz="1000" b="0" i="0" u="none" strike="noStrike" cap="none" normalizeH="0" baseline="0" dirty="0" smtClean="0">
-                <a:ln>
-                  <a:noFill/>
-                </a:ln>
-                <a:solidFill>
-                  <a:schemeClr val="tx1"/>
-                </a:solidFill>
-                <a:effectLst/>
-                <a:latin typeface="Arial" charset="0"/>
-                <a:ea typeface="ＭＳ Ｐゴシック" pitchFamily="-60" charset="-128"/>
-              </a:rPr>
-              <a:t>Low</a:t>
-            </a:r>
-            <a:endParaRPr kumimoji="0" lang="en-US" sz="1000" b="0" i="0" u="none" strike="noStrike" cap="none" normalizeH="0" baseline="0" dirty="0" smtClean="0">
-              <a:ln>
-                <a:noFill/>
-              </a:ln>
-              <a:solidFill>
-                <a:schemeClr val="tx1"/>
-              </a:solidFill>
-              <a:effectLst/>
-              <a:latin typeface="Arial" charset="0"/>
-              <a:ea typeface="ＭＳ Ｐゴシック" pitchFamily="-60" charset="-128"/>
-            </a:endParaRPr>
-          </a:p>
-        </p:txBody>
-      </p:sp>
-      <p:sp>
-        <p:nvSpPr>
-          <p:cNvPr id="5" name="TextBox 4"/>
-          <p:cNvSpPr txBox="1"/>
-          <p:nvPr/>
-        </p:nvSpPr>
-        <p:spPr>
-          <a:xfrm>
-            <a:off x="2965449" y="1841182"/>
-            <a:ext cx="1624172" cy="246221"/>
-          </a:xfrm>
-          <a:prstGeom prst="rect">
-            <a:avLst/>
-          </a:prstGeom>
-          <a:noFill/>
-        </p:spPr>
-        <p:txBody>
-          <a:bodyPr wrap="square" rtlCol="0">
-            <a:spAutoFit/>
-          </a:bodyPr>
-          <a:lstStyle/>
-          <a:p>
-            <a:r>
-              <a:rPr lang="en-US" sz="1000" dirty="0" smtClean="0"/>
-              <a:t>Enter the name a drug…</a:t>
-            </a:r>
-            <a:endParaRPr lang="en-US" sz="1000" dirty="0"/>
-          </a:p>
-        </p:txBody>
-      </p:sp>
-      <p:sp>
-        <p:nvSpPr>
-          <p:cNvPr id="18" name="Rounded Rectangle 17"/>
-          <p:cNvSpPr/>
-          <p:nvPr/>
-        </p:nvSpPr>
-        <p:spPr bwMode="auto">
-          <a:xfrm>
-            <a:off x="4589621" y="1862852"/>
-            <a:ext cx="677704" cy="224551"/>
-          </a:xfrm>
-          <a:prstGeom prst="roundRect">
-            <a:avLst/>
-          </a:prstGeom>
-          <a:solidFill>
-            <a:schemeClr val="accent3">
-              <a:lumMod val="85000"/>
-            </a:schemeClr>
-          </a:solidFill>
-          <a:ln w="9525" cap="flat" cmpd="sng" algn="ctr">
-            <a:solidFill>
-              <a:schemeClr val="tx1"/>
-            </a:solidFill>
-            <a:prstDash val="solid"/>
-            <a:round/>
-            <a:headEnd type="none" w="med" len="med"/>
-            <a:tailEnd type="none" w="med" len="med"/>
-          </a:ln>
-          <a:effectLst/>
-        </p:spPr>
-        <p:txBody>
-          <a:bodyPr vert="horz" wrap="square" lIns="91440" tIns="45720" rIns="91440" bIns="45720" numCol="1" rtlCol="0" anchor="t" anchorCtr="0" compatLnSpc="1">
-            <a:prstTxWarp prst="textNoShape">
-              <a:avLst/>
-            </a:prstTxWarp>
-          </a:bodyPr>
-          <a:lstStyle/>
-          <a:p>
-            <a:pPr marL="0" marR="0" indent="0" algn="ctr" defTabSz="914400" rtl="0" eaLnBrk="0" fontAlgn="base" latinLnBrk="0" hangingPunct="0">
-              <a:lnSpc>
-                <a:spcPct val="100000"/>
-              </a:lnSpc>
-              <a:spcBef>
-                <a:spcPct val="0"/>
-              </a:spcBef>
-              <a:spcAft>
-                <a:spcPct val="0"/>
-              </a:spcAft>
-              <a:buClrTx/>
-              <a:buSzTx/>
-              <a:buFontTx/>
-              <a:buNone/>
-              <a:tabLst/>
-            </a:pPr>
-            <a:r>
-              <a:rPr kumimoji="0" lang="en-US" sz="1000" b="0" i="0" u="none" strike="noStrike" cap="none" normalizeH="0" baseline="0" dirty="0" smtClean="0">
-                <a:ln>
-                  <a:noFill/>
-                </a:ln>
-                <a:solidFill>
-                  <a:schemeClr val="tx1"/>
-                </a:solidFill>
-                <a:effectLst/>
-                <a:latin typeface="Arial" charset="0"/>
-                <a:ea typeface="ＭＳ Ｐゴシック" pitchFamily="-60" charset="-128"/>
-              </a:rPr>
-              <a:t>Search</a:t>
-            </a:r>
-            <a:endParaRPr kumimoji="0" lang="en-US" sz="1000" b="0" i="0" u="none" strike="noStrike" cap="none" normalizeH="0" baseline="0" dirty="0" smtClean="0">
-              <a:ln>
-                <a:noFill/>
-              </a:ln>
-              <a:solidFill>
-                <a:schemeClr val="tx1"/>
-              </a:solidFill>
-              <a:effectLst/>
-              <a:latin typeface="Arial" charset="0"/>
-              <a:ea typeface="ＭＳ Ｐゴシック" pitchFamily="-60" charset="-128"/>
-            </a:endParaRPr>
-          </a:p>
-        </p:txBody>
-      </p:sp>
-      <p:sp>
-        <p:nvSpPr>
-          <p:cNvPr id="3" name="Rounded Rectangle 2"/>
-          <p:cNvSpPr/>
-          <p:nvPr/>
-        </p:nvSpPr>
-        <p:spPr bwMode="auto">
-          <a:xfrm>
-            <a:off x="4143375" y="2733674"/>
+            <a:off x="2965449" y="1832014"/>
             <a:ext cx="752475" cy="732709"/>
-          </a:xfrm>
-          <a:prstGeom prst="roundRect">
-            <a:avLst/>
-          </a:prstGeom>
-          <a:solidFill>
-            <a:srgbClr val="92D050"/>
-          </a:solidFill>
-          <a:ln w="9525" cap="flat" cmpd="sng" algn="ctr">
-            <a:solidFill>
-              <a:schemeClr val="tx1"/>
-            </a:solidFill>
-            <a:prstDash val="solid"/>
-            <a:round/>
-            <a:headEnd type="none" w="med" len="med"/>
-            <a:tailEnd type="none" w="med" len="med"/>
-          </a:ln>
-          <a:effectLst/>
-        </p:spPr>
-        <p:txBody>
-          <a:bodyPr vert="horz" wrap="square" lIns="91440" tIns="45720" rIns="91440" bIns="45720" numCol="1" rtlCol="0" anchor="t" anchorCtr="0" compatLnSpc="1">
-            <a:prstTxWarp prst="textNoShape">
-              <a:avLst/>
-            </a:prstTxWarp>
-          </a:bodyPr>
-          <a:lstStyle/>
-          <a:p>
-            <a:pPr marL="0" marR="0" indent="0" algn="l" defTabSz="914400" rtl="0" eaLnBrk="0" fontAlgn="base" latinLnBrk="0" hangingPunct="0">
-              <a:lnSpc>
-                <a:spcPct val="150000"/>
-              </a:lnSpc>
-              <a:spcBef>
-                <a:spcPct val="0"/>
-              </a:spcBef>
-              <a:spcAft>
-                <a:spcPct val="0"/>
-              </a:spcAft>
-              <a:buClrTx/>
-              <a:buSzTx/>
-              <a:buFontTx/>
-              <a:buNone/>
-              <a:tabLst/>
-            </a:pPr>
-            <a:r>
-              <a:rPr kumimoji="0" lang="en-US" sz="800" b="0" i="0" u="none" strike="noStrike" cap="none" normalizeH="0" baseline="0" dirty="0" smtClean="0">
-                <a:ln>
-                  <a:noFill/>
-                </a:ln>
-                <a:solidFill>
-                  <a:schemeClr val="tx1"/>
-                </a:solidFill>
-                <a:effectLst/>
-                <a:latin typeface="Arial" charset="0"/>
-                <a:ea typeface="ＭＳ Ｐゴシック" pitchFamily="-60" charset="-128"/>
-              </a:rPr>
-              <a:t>&lt;Image of drug here from </a:t>
-            </a:r>
-            <a:r>
-              <a:rPr kumimoji="0" lang="en-US" sz="800" b="0" i="0" u="none" strike="noStrike" cap="none" normalizeH="0" baseline="0" dirty="0" err="1" smtClean="0">
-                <a:ln>
-                  <a:noFill/>
-                </a:ln>
-                <a:solidFill>
-                  <a:schemeClr val="tx1"/>
-                </a:solidFill>
-                <a:effectLst/>
-                <a:latin typeface="Arial" charset="0"/>
-                <a:ea typeface="ＭＳ Ｐゴシック" pitchFamily="-60" charset="-128"/>
-              </a:rPr>
-              <a:t>NiH</a:t>
-            </a:r>
-            <a:r>
-              <a:rPr kumimoji="0" lang="en-US" sz="800" b="0" i="0" u="none" strike="noStrike" cap="none" normalizeH="0" baseline="0" dirty="0" smtClean="0">
-                <a:ln>
-                  <a:noFill/>
-                </a:ln>
-                <a:solidFill>
-                  <a:schemeClr val="tx1"/>
-                </a:solidFill>
-                <a:effectLst/>
-                <a:latin typeface="Arial" charset="0"/>
-                <a:ea typeface="ＭＳ Ｐゴシック" pitchFamily="-60" charset="-128"/>
-              </a:rPr>
-              <a:t>&gt;</a:t>
-            </a:r>
-            <a:endParaRPr kumimoji="0" lang="en-US" sz="800" b="0" i="0" u="none" strike="noStrike" cap="none" normalizeH="0" baseline="0" dirty="0" smtClean="0">
-              <a:ln>
-                <a:noFill/>
-              </a:ln>
-              <a:solidFill>
-                <a:schemeClr val="tx1"/>
-              </a:solidFill>
-              <a:effectLst/>
-              <a:latin typeface="Arial" charset="0"/>
-              <a:ea typeface="ＭＳ Ｐゴシック" pitchFamily="-60" charset="-128"/>
-            </a:endParaRPr>
-          </a:p>
-        </p:txBody>
-      </p:sp>
-      <p:sp>
-        <p:nvSpPr>
-          <p:cNvPr id="19" name="TextBox 18"/>
-          <p:cNvSpPr txBox="1"/>
-          <p:nvPr/>
-        </p:nvSpPr>
-        <p:spPr>
-          <a:xfrm>
-            <a:off x="3314700" y="3875186"/>
-            <a:ext cx="2209800" cy="307777"/>
-          </a:xfrm>
-          <a:prstGeom prst="rect">
-            <a:avLst/>
-          </a:prstGeom>
-          <a:noFill/>
-        </p:spPr>
-        <p:txBody>
-          <a:bodyPr wrap="square" rtlCol="0">
-            <a:spAutoFit/>
-          </a:bodyPr>
-          <a:lstStyle/>
-          <a:p>
-            <a:r>
-              <a:rPr lang="en-US" sz="1400" u="sng" dirty="0" smtClean="0"/>
-              <a:t>Additional information</a:t>
-            </a:r>
-            <a:endParaRPr lang="en-US" sz="1400" u="sng" dirty="0"/>
-          </a:p>
-        </p:txBody>
-      </p:sp>
-      <p:sp>
-        <p:nvSpPr>
-          <p:cNvPr id="20" name="Rectangle 19"/>
-          <p:cNvSpPr/>
-          <p:nvPr/>
-        </p:nvSpPr>
-        <p:spPr bwMode="auto">
-          <a:xfrm>
-            <a:off x="3032124" y="4182963"/>
-            <a:ext cx="2819400" cy="1608237"/>
           </a:xfrm>
           <a:prstGeom prst="rect">
             <a:avLst/>
           </a:prstGeom>
           <a:solidFill>
-            <a:schemeClr val="bg1"/>
+            <a:schemeClr val="accent1"/>
           </a:solidFill>
           <a:ln w="9525" cap="flat" cmpd="sng" algn="ctr">
             <a:solidFill>
@@ -6569,102 +6590,6 @@
               <a:buNone/>
               <a:tabLst/>
             </a:pPr>
-            <a:endParaRPr kumimoji="0" lang="en-US" sz="2400" b="0" i="0" u="none" strike="noStrike" cap="none" normalizeH="0" baseline="0" smtClean="0">
-              <a:ln>
-                <a:noFill/>
-              </a:ln>
-              <a:solidFill>
-                <a:schemeClr val="tx1"/>
-              </a:solidFill>
-              <a:effectLst/>
-              <a:latin typeface="Arial" charset="0"/>
-              <a:ea typeface="ＭＳ Ｐゴシック" pitchFamily="-60" charset="-128"/>
-            </a:endParaRPr>
-          </a:p>
-        </p:txBody>
-      </p:sp>
-      <p:sp>
-        <p:nvSpPr>
-          <p:cNvPr id="22" name="TextBox 21"/>
-          <p:cNvSpPr txBox="1"/>
-          <p:nvPr/>
-        </p:nvSpPr>
-        <p:spPr>
-          <a:xfrm>
-            <a:off x="3276600" y="4343400"/>
-            <a:ext cx="1990725" cy="707886"/>
-          </a:xfrm>
-          <a:prstGeom prst="rect">
-            <a:avLst/>
-          </a:prstGeom>
-          <a:noFill/>
-        </p:spPr>
-        <p:txBody>
-          <a:bodyPr wrap="square" rtlCol="0">
-            <a:spAutoFit/>
-          </a:bodyPr>
-          <a:lstStyle/>
-          <a:p>
-            <a:r>
-              <a:rPr lang="en-US" sz="1000" dirty="0" smtClean="0"/>
-              <a:t>Hyperlinks to Google search results here for “&lt;drug name&gt; + recall” and &lt;drug manufacturer&gt; + recall”.</a:t>
-            </a:r>
-            <a:endParaRPr lang="en-US" sz="1000" dirty="0"/>
-          </a:p>
-        </p:txBody>
-      </p:sp>
-      <p:sp>
-        <p:nvSpPr>
-          <p:cNvPr id="23" name="Rectangle 22"/>
-          <p:cNvSpPr/>
-          <p:nvPr/>
-        </p:nvSpPr>
-        <p:spPr bwMode="auto">
-          <a:xfrm>
-            <a:off x="2965449" y="2733673"/>
-            <a:ext cx="752475" cy="732709"/>
-          </a:xfrm>
-          <a:prstGeom prst="rect">
-            <a:avLst/>
-          </a:prstGeom>
-          <a:solidFill>
-            <a:schemeClr val="accent1"/>
-          </a:solidFill>
-          <a:ln w="9525" cap="flat" cmpd="sng" algn="ctr">
-            <a:solidFill>
-              <a:schemeClr val="tx1"/>
-            </a:solidFill>
-            <a:prstDash val="solid"/>
-            <a:round/>
-            <a:headEnd type="none" w="med" len="med"/>
-            <a:tailEnd type="none" w="med" len="med"/>
-          </a:ln>
-          <a:effectLst/>
-        </p:spPr>
-        <p:txBody>
-          <a:bodyPr vert="horz" wrap="square" lIns="91440" tIns="45720" rIns="91440" bIns="45720" numCol="1" rtlCol="0" anchor="t" anchorCtr="0" compatLnSpc="1">
-            <a:prstTxWarp prst="textNoShape">
-              <a:avLst/>
-            </a:prstTxWarp>
-          </a:bodyPr>
-          <a:lstStyle/>
-          <a:p>
-            <a:pPr marL="0" marR="0" indent="0" algn="l" defTabSz="914400" rtl="0" eaLnBrk="0" fontAlgn="base" latinLnBrk="0" hangingPunct="0">
-              <a:lnSpc>
-                <a:spcPct val="100000"/>
-              </a:lnSpc>
-              <a:spcBef>
-                <a:spcPct val="0"/>
-              </a:spcBef>
-              <a:spcAft>
-                <a:spcPct val="0"/>
-              </a:spcAft>
-              <a:buClrTx/>
-              <a:buSzTx/>
-              <a:buFontTx/>
-              <a:buNone/>
-              <a:tabLst/>
-            </a:pPr>
             <a:r>
               <a:rPr kumimoji="0" lang="en-US" sz="1000" b="0" i="0" u="none" strike="noStrike" cap="none" normalizeH="0" baseline="0" dirty="0" smtClean="0">
                 <a:ln>
@@ -6679,17 +6604,6 @@
               </a:rPr>
               <a:t>Drug details here from FDA</a:t>
             </a:r>
-            <a:endParaRPr kumimoji="0" lang="en-US" sz="1000" b="0" i="0" u="none" strike="noStrike" cap="none" normalizeH="0" baseline="0" dirty="0" smtClean="0">
-              <a:ln>
-                <a:noFill/>
-              </a:ln>
-              <a:solidFill>
-                <a:schemeClr val="tx1"/>
-              </a:solidFill>
-              <a:effectLst/>
-              <a:latin typeface="Arial" charset="0"/>
-              <a:ea typeface="ＭＳ Ｐゴシック" pitchFamily="-60" charset="-128"/>
-            </a:endParaRPr>
           </a:p>
         </p:txBody>
       </p:sp>
@@ -6710,6 +6624,1198 @@
       </p:par>
     </p:tnLst>
   </p:timing>
+</p:sld>
+</file>
+
+<file path=ppt/slides/slide5.xml><?xml version="1.0" encoding="utf-8"?>
+<p:sld xmlns:a="http://schemas.openxmlformats.org/drawingml/2006/main" xmlns:r="http://schemas.openxmlformats.org/officeDocument/2006/relationships" xmlns:p="http://schemas.openxmlformats.org/presentationml/2006/main">
+  <p:cSld>
+    <p:spTree>
+      <p:nvGrpSpPr>
+        <p:cNvPr id="1" name=""/>
+        <p:cNvGrpSpPr/>
+        <p:nvPr/>
+      </p:nvGrpSpPr>
+      <p:grpSpPr>
+        <a:xfrm>
+          <a:off x="0" y="0"/>
+          <a:ext cx="0" cy="0"/>
+          <a:chOff x="0" y="0"/>
+          <a:chExt cx="0" cy="0"/>
+        </a:xfrm>
+      </p:grpSpPr>
+      <p:sp>
+        <p:nvSpPr>
+          <p:cNvPr id="6" name="TextBox 5"/>
+          <p:cNvSpPr txBox="1"/>
+          <p:nvPr/>
+        </p:nvSpPr>
+        <p:spPr>
+          <a:xfrm>
+            <a:off x="-271388" y="641619"/>
+            <a:ext cx="1958090" cy="400110"/>
+          </a:xfrm>
+          <a:prstGeom prst="rect">
+            <a:avLst/>
+          </a:prstGeom>
+          <a:noFill/>
+        </p:spPr>
+        <p:txBody>
+          <a:bodyPr wrap="square" rtlCol="0">
+            <a:spAutoFit/>
+          </a:bodyPr>
+          <a:lstStyle/>
+          <a:p>
+            <a:pPr algn="r"/>
+            <a:r>
+              <a:rPr lang="en-US" sz="2000" b="1" dirty="0" smtClean="0"/>
+              <a:t>Logos:</a:t>
+            </a:r>
+            <a:endParaRPr lang="en-US" sz="2000" b="1" dirty="0"/>
+          </a:p>
+        </p:txBody>
+      </p:sp>
+      <p:sp>
+        <p:nvSpPr>
+          <p:cNvPr id="7" name="TextBox 6"/>
+          <p:cNvSpPr txBox="1"/>
+          <p:nvPr/>
+        </p:nvSpPr>
+        <p:spPr>
+          <a:xfrm>
+            <a:off x="91440" y="2447633"/>
+            <a:ext cx="1610336" cy="1015663"/>
+          </a:xfrm>
+          <a:prstGeom prst="rect">
+            <a:avLst/>
+          </a:prstGeom>
+          <a:noFill/>
+        </p:spPr>
+        <p:txBody>
+          <a:bodyPr wrap="square" rtlCol="0">
+            <a:spAutoFit/>
+          </a:bodyPr>
+          <a:lstStyle/>
+          <a:p>
+            <a:pPr algn="r"/>
+            <a:r>
+              <a:rPr lang="en-US" sz="2000" b="1" dirty="0" smtClean="0"/>
+              <a:t>Background and Fill Colors:</a:t>
+            </a:r>
+            <a:endParaRPr lang="en-US" sz="2000" b="1" dirty="0"/>
+          </a:p>
+        </p:txBody>
+      </p:sp>
+      <p:sp>
+        <p:nvSpPr>
+          <p:cNvPr id="9" name="Rectangle 8"/>
+          <p:cNvSpPr/>
+          <p:nvPr/>
+        </p:nvSpPr>
+        <p:spPr>
+          <a:xfrm>
+            <a:off x="1833302" y="2512627"/>
+            <a:ext cx="548640" cy="731520"/>
+          </a:xfrm>
+          <a:prstGeom prst="rect">
+            <a:avLst/>
+          </a:prstGeom>
+          <a:solidFill>
+            <a:srgbClr val="797A7E"/>
+          </a:solidFill>
+          <a:ln>
+            <a:noFill/>
+          </a:ln>
+        </p:spPr>
+        <p:style>
+          <a:lnRef idx="2">
+            <a:schemeClr val="accent1">
+              <a:shade val="50000"/>
+            </a:schemeClr>
+          </a:lnRef>
+          <a:fillRef idx="1">
+            <a:schemeClr val="accent1"/>
+          </a:fillRef>
+          <a:effectRef idx="0">
+            <a:schemeClr val="accent1"/>
+          </a:effectRef>
+          <a:fontRef idx="minor">
+            <a:schemeClr val="lt1"/>
+          </a:fontRef>
+        </p:style>
+        <p:txBody>
+          <a:bodyPr rtlCol="0" anchor="ctr"/>
+          <a:lstStyle/>
+          <a:p>
+            <a:pPr algn="ctr"/>
+            <a:endParaRPr lang="en-US"/>
+          </a:p>
+        </p:txBody>
+      </p:sp>
+      <p:sp>
+        <p:nvSpPr>
+          <p:cNvPr id="11" name="Rectangle 10"/>
+          <p:cNvSpPr/>
+          <p:nvPr/>
+        </p:nvSpPr>
+        <p:spPr>
+          <a:xfrm>
+            <a:off x="1825765" y="5249814"/>
+            <a:ext cx="548640" cy="731520"/>
+          </a:xfrm>
+          <a:prstGeom prst="rect">
+            <a:avLst/>
+          </a:prstGeom>
+          <a:solidFill>
+            <a:srgbClr val="1188FF"/>
+          </a:solidFill>
+          <a:ln>
+            <a:noFill/>
+          </a:ln>
+        </p:spPr>
+        <p:style>
+          <a:lnRef idx="2">
+            <a:schemeClr val="accent1">
+              <a:shade val="50000"/>
+            </a:schemeClr>
+          </a:lnRef>
+          <a:fillRef idx="1">
+            <a:schemeClr val="accent1"/>
+          </a:fillRef>
+          <a:effectRef idx="0">
+            <a:schemeClr val="accent1"/>
+          </a:effectRef>
+          <a:fontRef idx="minor">
+            <a:schemeClr val="lt1"/>
+          </a:fontRef>
+        </p:style>
+        <p:txBody>
+          <a:bodyPr rtlCol="0" anchor="ctr"/>
+          <a:lstStyle/>
+          <a:p>
+            <a:pPr algn="ctr"/>
+            <a:endParaRPr lang="en-US"/>
+          </a:p>
+        </p:txBody>
+      </p:sp>
+      <p:sp>
+        <p:nvSpPr>
+          <p:cNvPr id="12" name="Rectangle 11"/>
+          <p:cNvSpPr/>
+          <p:nvPr/>
+        </p:nvSpPr>
+        <p:spPr>
+          <a:xfrm>
+            <a:off x="2511565" y="4338654"/>
+            <a:ext cx="548640" cy="731520"/>
+          </a:xfrm>
+          <a:prstGeom prst="rect">
+            <a:avLst/>
+          </a:prstGeom>
+          <a:solidFill>
+            <a:srgbClr val="B51845"/>
+          </a:solidFill>
+          <a:ln>
+            <a:noFill/>
+          </a:ln>
+        </p:spPr>
+        <p:style>
+          <a:lnRef idx="2">
+            <a:schemeClr val="accent1">
+              <a:shade val="50000"/>
+            </a:schemeClr>
+          </a:lnRef>
+          <a:fillRef idx="1">
+            <a:schemeClr val="accent1"/>
+          </a:fillRef>
+          <a:effectRef idx="0">
+            <a:schemeClr val="accent1"/>
+          </a:effectRef>
+          <a:fontRef idx="minor">
+            <a:schemeClr val="lt1"/>
+          </a:fontRef>
+        </p:style>
+        <p:txBody>
+          <a:bodyPr rtlCol="0" anchor="ctr"/>
+          <a:lstStyle/>
+          <a:p>
+            <a:pPr algn="ctr"/>
+            <a:endParaRPr lang="en-US"/>
+          </a:p>
+        </p:txBody>
+      </p:sp>
+      <p:sp>
+        <p:nvSpPr>
+          <p:cNvPr id="14" name="TextBox 13"/>
+          <p:cNvSpPr txBox="1"/>
+          <p:nvPr/>
+        </p:nvSpPr>
+        <p:spPr>
+          <a:xfrm>
+            <a:off x="-249650" y="3393144"/>
+            <a:ext cx="1951426" cy="400110"/>
+          </a:xfrm>
+          <a:prstGeom prst="rect">
+            <a:avLst/>
+          </a:prstGeom>
+          <a:noFill/>
+        </p:spPr>
+        <p:txBody>
+          <a:bodyPr wrap="square" rtlCol="0">
+            <a:spAutoFit/>
+          </a:bodyPr>
+          <a:lstStyle/>
+          <a:p>
+            <a:pPr algn="r"/>
+            <a:r>
+              <a:rPr lang="en-US" sz="2000" b="1" dirty="0" smtClean="0"/>
+              <a:t>Font:</a:t>
+            </a:r>
+            <a:endParaRPr lang="en-US" sz="2000" b="1" dirty="0"/>
+          </a:p>
+        </p:txBody>
+      </p:sp>
+      <p:sp>
+        <p:nvSpPr>
+          <p:cNvPr id="15" name="TextBox 14"/>
+          <p:cNvSpPr txBox="1"/>
+          <p:nvPr/>
+        </p:nvSpPr>
+        <p:spPr>
+          <a:xfrm>
+            <a:off x="-226172" y="4338654"/>
+            <a:ext cx="1912874" cy="707886"/>
+          </a:xfrm>
+          <a:prstGeom prst="rect">
+            <a:avLst/>
+          </a:prstGeom>
+          <a:noFill/>
+        </p:spPr>
+        <p:txBody>
+          <a:bodyPr wrap="square" rtlCol="0">
+            <a:spAutoFit/>
+          </a:bodyPr>
+          <a:lstStyle/>
+          <a:p>
+            <a:pPr algn="r"/>
+            <a:r>
+              <a:rPr lang="en-US" sz="2000" b="1" dirty="0" smtClean="0"/>
+              <a:t>Accent Colors:</a:t>
+            </a:r>
+            <a:endParaRPr lang="en-US" sz="2000" b="1" dirty="0"/>
+          </a:p>
+        </p:txBody>
+      </p:sp>
+      <p:sp>
+        <p:nvSpPr>
+          <p:cNvPr id="16" name="Rectangle 15"/>
+          <p:cNvSpPr/>
+          <p:nvPr/>
+        </p:nvSpPr>
+        <p:spPr>
+          <a:xfrm>
+            <a:off x="3893629" y="2524595"/>
+            <a:ext cx="548640" cy="731520"/>
+          </a:xfrm>
+          <a:prstGeom prst="rect">
+            <a:avLst/>
+          </a:prstGeom>
+          <a:noFill/>
+          <a:ln>
+            <a:solidFill>
+              <a:schemeClr val="tx1"/>
+            </a:solidFill>
+          </a:ln>
+        </p:spPr>
+        <p:style>
+          <a:lnRef idx="2">
+            <a:schemeClr val="accent1">
+              <a:shade val="50000"/>
+            </a:schemeClr>
+          </a:lnRef>
+          <a:fillRef idx="1">
+            <a:schemeClr val="accent1"/>
+          </a:fillRef>
+          <a:effectRef idx="0">
+            <a:schemeClr val="accent1"/>
+          </a:effectRef>
+          <a:fontRef idx="minor">
+            <a:schemeClr val="lt1"/>
+          </a:fontRef>
+        </p:style>
+        <p:txBody>
+          <a:bodyPr rtlCol="0" anchor="ctr"/>
+          <a:lstStyle/>
+          <a:p>
+            <a:pPr algn="ctr"/>
+            <a:endParaRPr lang="en-US"/>
+          </a:p>
+        </p:txBody>
+      </p:sp>
+      <p:sp>
+        <p:nvSpPr>
+          <p:cNvPr id="17" name="Rectangle 16"/>
+          <p:cNvSpPr/>
+          <p:nvPr/>
+        </p:nvSpPr>
+        <p:spPr>
+          <a:xfrm>
+            <a:off x="1833749" y="3427494"/>
+            <a:ext cx="548640" cy="731520"/>
+          </a:xfrm>
+          <a:prstGeom prst="rect">
+            <a:avLst/>
+          </a:prstGeom>
+          <a:solidFill>
+            <a:schemeClr val="tx1"/>
+          </a:solidFill>
+          <a:ln>
+            <a:noFill/>
+          </a:ln>
+        </p:spPr>
+        <p:style>
+          <a:lnRef idx="2">
+            <a:schemeClr val="accent1">
+              <a:shade val="50000"/>
+            </a:schemeClr>
+          </a:lnRef>
+          <a:fillRef idx="1">
+            <a:schemeClr val="accent1"/>
+          </a:fillRef>
+          <a:effectRef idx="0">
+            <a:schemeClr val="accent1"/>
+          </a:effectRef>
+          <a:fontRef idx="minor">
+            <a:schemeClr val="lt1"/>
+          </a:fontRef>
+        </p:style>
+        <p:txBody>
+          <a:bodyPr rtlCol="0" anchor="ctr"/>
+          <a:lstStyle/>
+          <a:p>
+            <a:pPr algn="ctr"/>
+            <a:endParaRPr lang="en-US"/>
+          </a:p>
+        </p:txBody>
+      </p:sp>
+      <p:sp>
+        <p:nvSpPr>
+          <p:cNvPr id="19" name="Rectangle 18"/>
+          <p:cNvSpPr/>
+          <p:nvPr/>
+        </p:nvSpPr>
+        <p:spPr>
+          <a:xfrm>
+            <a:off x="3197365" y="2524595"/>
+            <a:ext cx="548640" cy="731520"/>
+          </a:xfrm>
+          <a:prstGeom prst="rect">
+            <a:avLst/>
+          </a:prstGeom>
+          <a:solidFill>
+            <a:srgbClr val="DDDEDF"/>
+          </a:solidFill>
+          <a:ln>
+            <a:noFill/>
+          </a:ln>
+        </p:spPr>
+        <p:style>
+          <a:lnRef idx="2">
+            <a:schemeClr val="accent1">
+              <a:shade val="50000"/>
+            </a:schemeClr>
+          </a:lnRef>
+          <a:fillRef idx="1">
+            <a:schemeClr val="accent1"/>
+          </a:fillRef>
+          <a:effectRef idx="0">
+            <a:schemeClr val="accent1"/>
+          </a:effectRef>
+          <a:fontRef idx="minor">
+            <a:schemeClr val="lt1"/>
+          </a:fontRef>
+        </p:style>
+        <p:txBody>
+          <a:bodyPr rtlCol="0" anchor="ctr"/>
+          <a:lstStyle/>
+          <a:p>
+            <a:pPr algn="ctr"/>
+            <a:endParaRPr lang="en-US"/>
+          </a:p>
+        </p:txBody>
+      </p:sp>
+      <p:sp>
+        <p:nvSpPr>
+          <p:cNvPr id="22" name="Rectangle 21"/>
+          <p:cNvSpPr/>
+          <p:nvPr/>
+        </p:nvSpPr>
+        <p:spPr>
+          <a:xfrm>
+            <a:off x="1825765" y="4338654"/>
+            <a:ext cx="548640" cy="731520"/>
+          </a:xfrm>
+          <a:prstGeom prst="rect">
+            <a:avLst/>
+          </a:prstGeom>
+          <a:solidFill>
+            <a:srgbClr val="D15600"/>
+          </a:solidFill>
+          <a:ln>
+            <a:noFill/>
+          </a:ln>
+        </p:spPr>
+        <p:style>
+          <a:lnRef idx="2">
+            <a:schemeClr val="accent1">
+              <a:shade val="50000"/>
+            </a:schemeClr>
+          </a:lnRef>
+          <a:fillRef idx="1">
+            <a:schemeClr val="accent1"/>
+          </a:fillRef>
+          <a:effectRef idx="0">
+            <a:schemeClr val="accent1"/>
+          </a:effectRef>
+          <a:fontRef idx="minor">
+            <a:schemeClr val="lt1"/>
+          </a:fontRef>
+        </p:style>
+        <p:txBody>
+          <a:bodyPr rtlCol="0" anchor="ctr"/>
+          <a:lstStyle/>
+          <a:p>
+            <a:pPr algn="ctr"/>
+            <a:endParaRPr lang="en-US"/>
+          </a:p>
+        </p:txBody>
+      </p:sp>
+      <p:sp>
+        <p:nvSpPr>
+          <p:cNvPr id="27" name="Rectangle 26"/>
+          <p:cNvSpPr/>
+          <p:nvPr/>
+        </p:nvSpPr>
+        <p:spPr>
+          <a:xfrm>
+            <a:off x="2511565" y="2524595"/>
+            <a:ext cx="548640" cy="731520"/>
+          </a:xfrm>
+          <a:prstGeom prst="rect">
+            <a:avLst/>
+          </a:prstGeom>
+          <a:solidFill>
+            <a:srgbClr val="BCBCBE"/>
+          </a:solidFill>
+          <a:ln>
+            <a:noFill/>
+          </a:ln>
+        </p:spPr>
+        <p:style>
+          <a:lnRef idx="2">
+            <a:schemeClr val="accent1">
+              <a:shade val="50000"/>
+            </a:schemeClr>
+          </a:lnRef>
+          <a:fillRef idx="1">
+            <a:schemeClr val="accent1"/>
+          </a:fillRef>
+          <a:effectRef idx="0">
+            <a:schemeClr val="accent1"/>
+          </a:effectRef>
+          <a:fontRef idx="minor">
+            <a:schemeClr val="lt1"/>
+          </a:fontRef>
+        </p:style>
+        <p:txBody>
+          <a:bodyPr rtlCol="0" anchor="ctr"/>
+          <a:lstStyle/>
+          <a:p>
+            <a:pPr algn="ctr"/>
+            <a:endParaRPr lang="en-US"/>
+          </a:p>
+        </p:txBody>
+      </p:sp>
+      <p:sp>
+        <p:nvSpPr>
+          <p:cNvPr id="28" name="TextBox 27"/>
+          <p:cNvSpPr txBox="1"/>
+          <p:nvPr/>
+        </p:nvSpPr>
+        <p:spPr>
+          <a:xfrm>
+            <a:off x="-226172" y="5215464"/>
+            <a:ext cx="1912874" cy="707886"/>
+          </a:xfrm>
+          <a:prstGeom prst="rect">
+            <a:avLst/>
+          </a:prstGeom>
+          <a:noFill/>
+        </p:spPr>
+        <p:txBody>
+          <a:bodyPr wrap="square" rtlCol="0">
+            <a:spAutoFit/>
+          </a:bodyPr>
+          <a:lstStyle/>
+          <a:p>
+            <a:pPr algn="r"/>
+            <a:r>
+              <a:rPr lang="en-US" sz="2000" b="1" dirty="0" smtClean="0"/>
+              <a:t>18F Logo Color:</a:t>
+            </a:r>
+            <a:endParaRPr lang="en-US" sz="2000" b="1" dirty="0"/>
+          </a:p>
+        </p:txBody>
+      </p:sp>
+      <p:sp>
+        <p:nvSpPr>
+          <p:cNvPr id="29" name="TextBox 28"/>
+          <p:cNvSpPr txBox="1"/>
+          <p:nvPr/>
+        </p:nvSpPr>
+        <p:spPr>
+          <a:xfrm>
+            <a:off x="5966460" y="2536055"/>
+            <a:ext cx="2468880" cy="461665"/>
+          </a:xfrm>
+          <a:prstGeom prst="rect">
+            <a:avLst/>
+          </a:prstGeom>
+          <a:noFill/>
+        </p:spPr>
+        <p:txBody>
+          <a:bodyPr wrap="square" rtlCol="0">
+            <a:spAutoFit/>
+          </a:bodyPr>
+          <a:lstStyle/>
+          <a:p>
+            <a:r>
+              <a:rPr lang="en-US" sz="1200" dirty="0" smtClean="0">
+                <a:latin typeface="Arial" panose="020B0604020202020204" pitchFamily="34" charset="0"/>
+                <a:cs typeface="Arial" panose="020B0604020202020204" pitchFamily="34" charset="0"/>
+              </a:rPr>
+              <a:t>Body Text – Arial/Sans Serif, 12 </a:t>
+            </a:r>
+            <a:r>
+              <a:rPr lang="en-US" sz="1200" dirty="0" err="1" smtClean="0">
+                <a:latin typeface="Arial" panose="020B0604020202020204" pitchFamily="34" charset="0"/>
+                <a:cs typeface="Arial" panose="020B0604020202020204" pitchFamily="34" charset="0"/>
+              </a:rPr>
+              <a:t>pt</a:t>
+            </a:r>
+            <a:endParaRPr lang="en-US" sz="1200" dirty="0">
+              <a:latin typeface="Arial" panose="020B0604020202020204" pitchFamily="34" charset="0"/>
+              <a:cs typeface="Arial" panose="020B0604020202020204" pitchFamily="34" charset="0"/>
+            </a:endParaRPr>
+          </a:p>
+        </p:txBody>
+      </p:sp>
+      <p:sp>
+        <p:nvSpPr>
+          <p:cNvPr id="30" name="TextBox 29"/>
+          <p:cNvSpPr txBox="1"/>
+          <p:nvPr/>
+        </p:nvSpPr>
+        <p:spPr>
+          <a:xfrm>
+            <a:off x="5966460" y="3155519"/>
+            <a:ext cx="2948940" cy="584775"/>
+          </a:xfrm>
+          <a:prstGeom prst="rect">
+            <a:avLst/>
+          </a:prstGeom>
+          <a:noFill/>
+        </p:spPr>
+        <p:txBody>
+          <a:bodyPr wrap="square" rtlCol="0">
+            <a:spAutoFit/>
+          </a:bodyPr>
+          <a:lstStyle/>
+          <a:p>
+            <a:r>
+              <a:rPr lang="en-US" sz="1600" b="1" dirty="0" smtClean="0">
+                <a:latin typeface="Arial" panose="020B0604020202020204" pitchFamily="34" charset="0"/>
+                <a:cs typeface="Arial" panose="020B0604020202020204" pitchFamily="34" charset="0"/>
+              </a:rPr>
+              <a:t>Heading – Arial/Sans Serif Bold 16 </a:t>
+            </a:r>
+            <a:r>
+              <a:rPr lang="en-US" sz="1600" b="1" dirty="0" err="1" smtClean="0">
+                <a:latin typeface="Arial" panose="020B0604020202020204" pitchFamily="34" charset="0"/>
+                <a:cs typeface="Arial" panose="020B0604020202020204" pitchFamily="34" charset="0"/>
+              </a:rPr>
+              <a:t>pt</a:t>
+            </a:r>
+            <a:endParaRPr lang="en-US" sz="1600" b="1" dirty="0">
+              <a:latin typeface="Arial" panose="020B0604020202020204" pitchFamily="34" charset="0"/>
+              <a:cs typeface="Arial" panose="020B0604020202020204" pitchFamily="34" charset="0"/>
+            </a:endParaRPr>
+          </a:p>
+        </p:txBody>
+      </p:sp>
+      <p:sp>
+        <p:nvSpPr>
+          <p:cNvPr id="31" name="TextBox 30"/>
+          <p:cNvSpPr txBox="1"/>
+          <p:nvPr/>
+        </p:nvSpPr>
+        <p:spPr>
+          <a:xfrm>
+            <a:off x="5966460" y="2869959"/>
+            <a:ext cx="3383280" cy="276999"/>
+          </a:xfrm>
+          <a:prstGeom prst="rect">
+            <a:avLst/>
+          </a:prstGeom>
+          <a:noFill/>
+        </p:spPr>
+        <p:txBody>
+          <a:bodyPr wrap="square" rtlCol="0">
+            <a:spAutoFit/>
+          </a:bodyPr>
+          <a:lstStyle/>
+          <a:p>
+            <a:r>
+              <a:rPr lang="en-US" sz="1200" b="1" dirty="0" smtClean="0">
+                <a:latin typeface="Arial" panose="020B0604020202020204" pitchFamily="34" charset="0"/>
+                <a:cs typeface="Arial" panose="020B0604020202020204" pitchFamily="34" charset="0"/>
+              </a:rPr>
+              <a:t>Form Fields or Buttons – Arial 12pt Bold</a:t>
+            </a:r>
+            <a:endParaRPr lang="en-US" sz="1200" b="1" dirty="0">
+              <a:latin typeface="Arial" panose="020B0604020202020204" pitchFamily="34" charset="0"/>
+              <a:cs typeface="Arial" panose="020B0604020202020204" pitchFamily="34" charset="0"/>
+            </a:endParaRPr>
+          </a:p>
+        </p:txBody>
+      </p:sp>
+      <p:sp>
+        <p:nvSpPr>
+          <p:cNvPr id="2" name="TextBox 1"/>
+          <p:cNvSpPr txBox="1"/>
+          <p:nvPr/>
+        </p:nvSpPr>
+        <p:spPr>
+          <a:xfrm>
+            <a:off x="2381941" y="5415519"/>
+            <a:ext cx="6477158" cy="369332"/>
+          </a:xfrm>
+          <a:prstGeom prst="rect">
+            <a:avLst/>
+          </a:prstGeom>
+          <a:noFill/>
+        </p:spPr>
+        <p:txBody>
+          <a:bodyPr wrap="none" rtlCol="0">
+            <a:spAutoFit/>
+          </a:bodyPr>
+          <a:lstStyle/>
+          <a:p>
+            <a:r>
+              <a:rPr lang="en-US" dirty="0" smtClean="0"/>
+              <a:t>We may want to use their instead of our, or add it in in places.</a:t>
+            </a:r>
+            <a:endParaRPr lang="en-US" dirty="0"/>
+          </a:p>
+        </p:txBody>
+      </p:sp>
+      <p:sp>
+        <p:nvSpPr>
+          <p:cNvPr id="23" name="TextBox 22"/>
+          <p:cNvSpPr txBox="1"/>
+          <p:nvPr/>
+        </p:nvSpPr>
+        <p:spPr>
+          <a:xfrm>
+            <a:off x="3060205" y="4519748"/>
+            <a:ext cx="2822119" cy="369332"/>
+          </a:xfrm>
+          <a:prstGeom prst="rect">
+            <a:avLst/>
+          </a:prstGeom>
+          <a:noFill/>
+        </p:spPr>
+        <p:txBody>
+          <a:bodyPr wrap="none" rtlCol="0">
+            <a:spAutoFit/>
+          </a:bodyPr>
+          <a:lstStyle/>
+          <a:p>
+            <a:r>
+              <a:rPr lang="en-US" dirty="0" smtClean="0"/>
+              <a:t>Use red sparingly, if at all.</a:t>
+            </a:r>
+            <a:endParaRPr lang="en-US" dirty="0"/>
+          </a:p>
+        </p:txBody>
+      </p:sp>
+      <p:pic>
+        <p:nvPicPr>
+          <p:cNvPr id="24" name="Picture 2" descr="18F logo"/>
+          <p:cNvPicPr>
+            <a:picLocks noChangeAspect="1" noChangeArrowheads="1"/>
+          </p:cNvPicPr>
+          <p:nvPr/>
+        </p:nvPicPr>
+        <p:blipFill>
+          <a:blip r:embed="rId2" cstate="print">
+            <a:extLst>
+              <a:ext uri="{28A0092B-C50C-407E-A947-70E740481C1C}">
+                <a14:useLocalDpi xmlns:a14="http://schemas.microsoft.com/office/drawing/2010/main" val="0"/>
+              </a:ext>
+            </a:extLst>
+          </a:blip>
+          <a:srcRect/>
+          <a:stretch>
+            <a:fillRect/>
+          </a:stretch>
+        </p:blipFill>
+        <p:spPr bwMode="auto">
+          <a:xfrm>
+            <a:off x="4186999" y="607023"/>
+            <a:ext cx="914400" cy="914400"/>
+          </a:xfrm>
+          <a:prstGeom prst="rect">
+            <a:avLst/>
+          </a:prstGeom>
+          <a:noFill/>
+          <a:extLst>
+            <a:ext uri="{909E8E84-426E-40DD-AFC4-6F175D3DCCD1}">
+              <a14:hiddenFill xmlns:a14="http://schemas.microsoft.com/office/drawing/2010/main">
+                <a:solidFill>
+                  <a:srgbClr val="FFFFFF"/>
+                </a:solidFill>
+              </a14:hiddenFill>
+            </a:ext>
+          </a:extLst>
+        </p:spPr>
+      </p:pic>
+      <p:pic>
+        <p:nvPicPr>
+          <p:cNvPr id="25" name="Picture 24" descr="DEV-Logo_RGB.gif"/>
+          <p:cNvPicPr>
+            <a:picLocks noChangeAspect="1"/>
+          </p:cNvPicPr>
+          <p:nvPr/>
+        </p:nvPicPr>
+        <p:blipFill>
+          <a:blip r:embed="rId3" cstate="print">
+            <a:extLst>
+              <a:ext uri="{28A0092B-C50C-407E-A947-70E740481C1C}">
+                <a14:useLocalDpi xmlns:a14="http://schemas.microsoft.com/office/drawing/2010/main" val="0"/>
+              </a:ext>
+            </a:extLst>
+          </a:blip>
+          <a:srcRect/>
+          <a:stretch>
+            <a:fillRect/>
+          </a:stretch>
+        </p:blipFill>
+        <p:spPr bwMode="auto">
+          <a:xfrm>
+            <a:off x="1871485" y="641619"/>
+            <a:ext cx="1828800" cy="679835"/>
+          </a:xfrm>
+          <a:prstGeom prst="rect">
+            <a:avLst/>
+          </a:prstGeom>
+          <a:noFill/>
+          <a:ln>
+            <a:noFill/>
+          </a:ln>
+        </p:spPr>
+      </p:pic>
+    </p:spTree>
+    <p:extLst>
+      <p:ext uri="{BB962C8B-B14F-4D97-AF65-F5344CB8AC3E}">
+        <p14:creationId xmlns:p14="http://schemas.microsoft.com/office/powerpoint/2010/main" val="2669925249"/>
+      </p:ext>
+    </p:extLst>
+  </p:cSld>
+  <p:clrMapOvr>
+    <a:masterClrMapping/>
+  </p:clrMapOvr>
+</p:sld>
+</file>
+
+<file path=ppt/slides/slide6.xml><?xml version="1.0" encoding="utf-8"?>
+<p:sld xmlns:a="http://schemas.openxmlformats.org/drawingml/2006/main" xmlns:r="http://schemas.openxmlformats.org/officeDocument/2006/relationships" xmlns:p="http://schemas.openxmlformats.org/presentationml/2006/main">
+  <p:cSld>
+    <p:spTree>
+      <p:nvGrpSpPr>
+        <p:cNvPr id="1" name=""/>
+        <p:cNvGrpSpPr/>
+        <p:nvPr/>
+      </p:nvGrpSpPr>
+      <p:grpSpPr>
+        <a:xfrm>
+          <a:off x="0" y="0"/>
+          <a:ext cx="0" cy="0"/>
+          <a:chOff x="0" y="0"/>
+          <a:chExt cx="0" cy="0"/>
+        </a:xfrm>
+      </p:grpSpPr>
+      <p:sp>
+        <p:nvSpPr>
+          <p:cNvPr id="2" name="Title 1"/>
+          <p:cNvSpPr>
+            <a:spLocks noGrp="1"/>
+          </p:cNvSpPr>
+          <p:nvPr>
+            <p:ph type="title"/>
+          </p:nvPr>
+        </p:nvSpPr>
+        <p:spPr/>
+        <p:txBody>
+          <a:bodyPr/>
+          <a:lstStyle/>
+          <a:p>
+            <a:r>
+              <a:rPr lang="en-US" dirty="0" smtClean="0"/>
+              <a:t>Icons</a:t>
+            </a:r>
+            <a:endParaRPr lang="en-US" dirty="0"/>
+          </a:p>
+        </p:txBody>
+      </p:sp>
+      <p:pic>
+        <p:nvPicPr>
+          <p:cNvPr id="11" name="Picture 2" descr="Application Development and Modernization"/>
+          <p:cNvPicPr>
+            <a:picLocks noChangeAspect="1" noChangeArrowheads="1"/>
+          </p:cNvPicPr>
+          <p:nvPr/>
+        </p:nvPicPr>
+        <p:blipFill>
+          <a:blip r:embed="rId2">
+            <a:extLst>
+              <a:ext uri="{28A0092B-C50C-407E-A947-70E740481C1C}">
+                <a14:useLocalDpi xmlns:a14="http://schemas.microsoft.com/office/drawing/2010/main" val="0"/>
+              </a:ext>
+            </a:extLst>
+          </a:blip>
+          <a:srcRect/>
+          <a:stretch>
+            <a:fillRect/>
+          </a:stretch>
+        </p:blipFill>
+        <p:spPr bwMode="auto">
+          <a:xfrm>
+            <a:off x="969491" y="1851750"/>
+            <a:ext cx="476250" cy="476250"/>
+          </a:xfrm>
+          <a:prstGeom prst="rect">
+            <a:avLst/>
+          </a:prstGeom>
+          <a:noFill/>
+          <a:extLst>
+            <a:ext uri="{909E8E84-426E-40DD-AFC4-6F175D3DCCD1}">
+              <a14:hiddenFill xmlns:a14="http://schemas.microsoft.com/office/drawing/2010/main">
+                <a:solidFill>
+                  <a:srgbClr val="FFFFFF"/>
+                </a:solidFill>
+              </a14:hiddenFill>
+            </a:ext>
+          </a:extLst>
+        </p:spPr>
+      </p:pic>
+      <p:pic>
+        <p:nvPicPr>
+          <p:cNvPr id="12" name="Picture 4" descr="Microsoft Applications Solutions"/>
+          <p:cNvPicPr>
+            <a:picLocks noChangeAspect="1" noChangeArrowheads="1"/>
+          </p:cNvPicPr>
+          <p:nvPr/>
+        </p:nvPicPr>
+        <p:blipFill>
+          <a:blip r:embed="rId3">
+            <a:extLst>
+              <a:ext uri="{28A0092B-C50C-407E-A947-70E740481C1C}">
+                <a14:useLocalDpi xmlns:a14="http://schemas.microsoft.com/office/drawing/2010/main" val="0"/>
+              </a:ext>
+            </a:extLst>
+          </a:blip>
+          <a:srcRect/>
+          <a:stretch>
+            <a:fillRect/>
+          </a:stretch>
+        </p:blipFill>
+        <p:spPr bwMode="auto">
+          <a:xfrm>
+            <a:off x="969491" y="2449513"/>
+            <a:ext cx="476250" cy="476250"/>
+          </a:xfrm>
+          <a:prstGeom prst="rect">
+            <a:avLst/>
+          </a:prstGeom>
+          <a:noFill/>
+          <a:extLst>
+            <a:ext uri="{909E8E84-426E-40DD-AFC4-6F175D3DCCD1}">
+              <a14:hiddenFill xmlns:a14="http://schemas.microsoft.com/office/drawing/2010/main">
+                <a:solidFill>
+                  <a:srgbClr val="FFFFFF"/>
+                </a:solidFill>
+              </a14:hiddenFill>
+            </a:ext>
+          </a:extLst>
+        </p:spPr>
+      </p:pic>
+      <p:pic>
+        <p:nvPicPr>
+          <p:cNvPr id="13" name="Picture 6" descr="Systems Architecture and Integration icon"/>
+          <p:cNvPicPr>
+            <a:picLocks noChangeAspect="1" noChangeArrowheads="1"/>
+          </p:cNvPicPr>
+          <p:nvPr/>
+        </p:nvPicPr>
+        <p:blipFill>
+          <a:blip r:embed="rId4" cstate="print">
+            <a:extLst>
+              <a:ext uri="{28A0092B-C50C-407E-A947-70E740481C1C}">
+                <a14:useLocalDpi xmlns:a14="http://schemas.microsoft.com/office/drawing/2010/main" val="0"/>
+              </a:ext>
+            </a:extLst>
+          </a:blip>
+          <a:srcRect/>
+          <a:stretch>
+            <a:fillRect/>
+          </a:stretch>
+        </p:blipFill>
+        <p:spPr bwMode="auto">
+          <a:xfrm>
+            <a:off x="970253" y="3168790"/>
+            <a:ext cx="475488" cy="475488"/>
+          </a:xfrm>
+          <a:prstGeom prst="rect">
+            <a:avLst/>
+          </a:prstGeom>
+          <a:noFill/>
+          <a:extLst>
+            <a:ext uri="{909E8E84-426E-40DD-AFC4-6F175D3DCCD1}">
+              <a14:hiddenFill xmlns:a14="http://schemas.microsoft.com/office/drawing/2010/main">
+                <a:solidFill>
+                  <a:srgbClr val="FFFFFF"/>
+                </a:solidFill>
+              </a14:hiddenFill>
+            </a:ext>
+          </a:extLst>
+        </p:spPr>
+      </p:pic>
+      <p:pic>
+        <p:nvPicPr>
+          <p:cNvPr id="14" name="Picture 8" descr="Data and Database Consulting icon"/>
+          <p:cNvPicPr>
+            <a:picLocks noChangeAspect="1" noChangeArrowheads="1"/>
+          </p:cNvPicPr>
+          <p:nvPr/>
+        </p:nvPicPr>
+        <p:blipFill>
+          <a:blip r:embed="rId5">
+            <a:extLst>
+              <a:ext uri="{28A0092B-C50C-407E-A947-70E740481C1C}">
+                <a14:useLocalDpi xmlns:a14="http://schemas.microsoft.com/office/drawing/2010/main" val="0"/>
+              </a:ext>
+            </a:extLst>
+          </a:blip>
+          <a:srcRect/>
+          <a:stretch>
+            <a:fillRect/>
+          </a:stretch>
+        </p:blipFill>
+        <p:spPr bwMode="auto">
+          <a:xfrm>
+            <a:off x="969491" y="3887305"/>
+            <a:ext cx="476250" cy="476250"/>
+          </a:xfrm>
+          <a:prstGeom prst="rect">
+            <a:avLst/>
+          </a:prstGeom>
+          <a:noFill/>
+          <a:extLst>
+            <a:ext uri="{909E8E84-426E-40DD-AFC4-6F175D3DCCD1}">
+              <a14:hiddenFill xmlns:a14="http://schemas.microsoft.com/office/drawing/2010/main">
+                <a:solidFill>
+                  <a:srgbClr val="FFFFFF"/>
+                </a:solidFill>
+              </a14:hiddenFill>
+            </a:ext>
+          </a:extLst>
+        </p:spPr>
+      </p:pic>
+      <p:pic>
+        <p:nvPicPr>
+          <p:cNvPr id="15" name="Picture 10" descr="BMC Remedy and Infrastructure Management icon"/>
+          <p:cNvPicPr>
+            <a:picLocks noChangeAspect="1" noChangeArrowheads="1"/>
+          </p:cNvPicPr>
+          <p:nvPr/>
+        </p:nvPicPr>
+        <p:blipFill>
+          <a:blip r:embed="rId6">
+            <a:extLst>
+              <a:ext uri="{28A0092B-C50C-407E-A947-70E740481C1C}">
+                <a14:useLocalDpi xmlns:a14="http://schemas.microsoft.com/office/drawing/2010/main" val="0"/>
+              </a:ext>
+            </a:extLst>
+          </a:blip>
+          <a:srcRect/>
+          <a:stretch>
+            <a:fillRect/>
+          </a:stretch>
+        </p:blipFill>
+        <p:spPr bwMode="auto">
+          <a:xfrm>
+            <a:off x="969491" y="4666110"/>
+            <a:ext cx="476250" cy="476250"/>
+          </a:xfrm>
+          <a:prstGeom prst="rect">
+            <a:avLst/>
+          </a:prstGeom>
+          <a:noFill/>
+          <a:extLst>
+            <a:ext uri="{909E8E84-426E-40DD-AFC4-6F175D3DCCD1}">
+              <a14:hiddenFill xmlns:a14="http://schemas.microsoft.com/office/drawing/2010/main">
+                <a:solidFill>
+                  <a:srgbClr val="FFFFFF"/>
+                </a:solidFill>
+              </a14:hiddenFill>
+            </a:ext>
+          </a:extLst>
+        </p:spPr>
+      </p:pic>
+      <p:pic>
+        <p:nvPicPr>
+          <p:cNvPr id="16" name="Picture 12" descr="Multi-Modal Biometrics icon"/>
+          <p:cNvPicPr>
+            <a:picLocks noChangeAspect="1" noChangeArrowheads="1"/>
+          </p:cNvPicPr>
+          <p:nvPr/>
+        </p:nvPicPr>
+        <p:blipFill>
+          <a:blip r:embed="rId7">
+            <a:extLst>
+              <a:ext uri="{28A0092B-C50C-407E-A947-70E740481C1C}">
+                <a14:useLocalDpi xmlns:a14="http://schemas.microsoft.com/office/drawing/2010/main" val="0"/>
+              </a:ext>
+            </a:extLst>
+          </a:blip>
+          <a:srcRect/>
+          <a:stretch>
+            <a:fillRect/>
+          </a:stretch>
+        </p:blipFill>
+        <p:spPr bwMode="auto">
+          <a:xfrm>
+            <a:off x="969491" y="5325097"/>
+            <a:ext cx="476250" cy="476250"/>
+          </a:xfrm>
+          <a:prstGeom prst="rect">
+            <a:avLst/>
+          </a:prstGeom>
+          <a:noFill/>
+          <a:extLst>
+            <a:ext uri="{909E8E84-426E-40DD-AFC4-6F175D3DCCD1}">
+              <a14:hiddenFill xmlns:a14="http://schemas.microsoft.com/office/drawing/2010/main">
+                <a:solidFill>
+                  <a:srgbClr val="FFFFFF"/>
+                </a:solidFill>
+              </a14:hiddenFill>
+            </a:ext>
+          </a:extLst>
+        </p:spPr>
+      </p:pic>
+      <p:pic>
+        <p:nvPicPr>
+          <p:cNvPr id="17" name="Picture 14" descr="Contact and Directions icon"/>
+          <p:cNvPicPr>
+            <a:picLocks noChangeAspect="1" noChangeArrowheads="1"/>
+          </p:cNvPicPr>
+          <p:nvPr/>
+        </p:nvPicPr>
+        <p:blipFill>
+          <a:blip r:embed="rId8">
+            <a:extLst>
+              <a:ext uri="{28A0092B-C50C-407E-A947-70E740481C1C}">
+                <a14:useLocalDpi xmlns:a14="http://schemas.microsoft.com/office/drawing/2010/main" val="0"/>
+              </a:ext>
+            </a:extLst>
+          </a:blip>
+          <a:srcRect/>
+          <a:stretch>
+            <a:fillRect/>
+          </a:stretch>
+        </p:blipFill>
+        <p:spPr bwMode="auto">
+          <a:xfrm>
+            <a:off x="1764074" y="1853009"/>
+            <a:ext cx="476250" cy="476250"/>
+          </a:xfrm>
+          <a:prstGeom prst="rect">
+            <a:avLst/>
+          </a:prstGeom>
+          <a:noFill/>
+          <a:extLst>
+            <a:ext uri="{909E8E84-426E-40DD-AFC4-6F175D3DCCD1}">
+              <a14:hiddenFill xmlns:a14="http://schemas.microsoft.com/office/drawing/2010/main">
+                <a:solidFill>
+                  <a:srgbClr val="FFFFFF"/>
+                </a:solidFill>
+              </a14:hiddenFill>
+            </a:ext>
+          </a:extLst>
+        </p:spPr>
+      </p:pic>
+      <p:pic>
+        <p:nvPicPr>
+          <p:cNvPr id="18" name="Picture 16" descr="MgmtTeam"/>
+          <p:cNvPicPr>
+            <a:picLocks noChangeAspect="1" noChangeArrowheads="1"/>
+          </p:cNvPicPr>
+          <p:nvPr/>
+        </p:nvPicPr>
+        <p:blipFill>
+          <a:blip r:embed="rId9" cstate="print">
+            <a:extLst>
+              <a:ext uri="{28A0092B-C50C-407E-A947-70E740481C1C}">
+                <a14:useLocalDpi xmlns:a14="http://schemas.microsoft.com/office/drawing/2010/main" val="0"/>
+              </a:ext>
+            </a:extLst>
+          </a:blip>
+          <a:srcRect/>
+          <a:stretch>
+            <a:fillRect/>
+          </a:stretch>
+        </p:blipFill>
+        <p:spPr bwMode="auto">
+          <a:xfrm>
+            <a:off x="1764074" y="2449513"/>
+            <a:ext cx="475488" cy="475488"/>
+          </a:xfrm>
+          <a:prstGeom prst="rect">
+            <a:avLst/>
+          </a:prstGeom>
+          <a:noFill/>
+          <a:extLst>
+            <a:ext uri="{909E8E84-426E-40DD-AFC4-6F175D3DCCD1}">
+              <a14:hiddenFill xmlns:a14="http://schemas.microsoft.com/office/drawing/2010/main">
+                <a:solidFill>
+                  <a:srgbClr val="FFFFFF"/>
+                </a:solidFill>
+              </a14:hiddenFill>
+            </a:ext>
+          </a:extLst>
+        </p:spPr>
+      </p:pic>
+    </p:spTree>
+    <p:extLst>
+      <p:ext uri="{BB962C8B-B14F-4D97-AF65-F5344CB8AC3E}">
+        <p14:creationId xmlns:p14="http://schemas.microsoft.com/office/powerpoint/2010/main" val="370414017"/>
+      </p:ext>
+    </p:extLst>
+  </p:cSld>
+  <p:clrMapOvr>
+    <a:masterClrMapping/>
+  </p:clrMapOvr>
 </p:sld>
 </file>
 

</xml_diff>